<commit_message>
Completed running user through a Use Case
</commit_message>
<xml_diff>
--- a/pptx/diagrams.pptx
+++ b/pptx/diagrams.pptx
@@ -21052,7 +21052,7 @@
         <p:spPr>
           <a:xfrm>
             <a:off x="1598678" y="3802815"/>
-            <a:ext cx="4772545" cy="646331"/>
+            <a:ext cx="5448374" cy="646331"/>
           </a:xfrm>
           <a:prstGeom prst="rect">
             <a:avLst/>
@@ -21135,8 +21135,8 @@
         </p:nvSpPr>
         <p:spPr>
           <a:xfrm>
-            <a:off x="2441539" y="617863"/>
-            <a:ext cx="3580584" cy="646331"/>
+            <a:off x="1762122" y="617863"/>
+            <a:ext cx="4260001" cy="646331"/>
           </a:xfrm>
           <a:prstGeom prst="rect">
             <a:avLst/>

</xml_diff>

<commit_message>
Add few more slides and includes suggestions from Ashutosh
</commit_message>
<xml_diff>
--- a/pptx/diagrams.pptx
+++ b/pptx/diagrams.pptx
@@ -22,6 +22,8 @@
     <p:sldId id="272" r:id="rId16"/>
     <p:sldId id="273" r:id="rId17"/>
     <p:sldId id="263" r:id="rId18"/>
+    <p:sldId id="274" r:id="rId19"/>
+    <p:sldId id="275" r:id="rId20"/>
   </p:sldIdLst>
   <p:sldSz cx="9144000" cy="6858000" type="screen4x3"/>
   <p:notesSz cx="6858000" cy="9144000"/>
@@ -12024,7 +12026,7 @@
           <a:p>
             <a:fld id="{72C66310-64BB-0647-8D90-8DA6B7A60B92}" type="datetimeFigureOut">
               <a:rPr lang="en-US" smtClean="0"/>
-              <a:t>1/1/15</a:t>
+              <a:t>1/5/15</a:t>
             </a:fld>
             <a:endParaRPr lang="en-US"/>
           </a:p>
@@ -12194,7 +12196,7 @@
           <a:p>
             <a:fld id="{72C66310-64BB-0647-8D90-8DA6B7A60B92}" type="datetimeFigureOut">
               <a:rPr lang="en-US" smtClean="0"/>
-              <a:t>1/1/15</a:t>
+              <a:t>1/5/15</a:t>
             </a:fld>
             <a:endParaRPr lang="en-US"/>
           </a:p>
@@ -12374,7 +12376,7 @@
           <a:p>
             <a:fld id="{72C66310-64BB-0647-8D90-8DA6B7A60B92}" type="datetimeFigureOut">
               <a:rPr lang="en-US" smtClean="0"/>
-              <a:t>1/1/15</a:t>
+              <a:t>1/5/15</a:t>
             </a:fld>
             <a:endParaRPr lang="en-US"/>
           </a:p>
@@ -12544,7 +12546,7 @@
           <a:p>
             <a:fld id="{72C66310-64BB-0647-8D90-8DA6B7A60B92}" type="datetimeFigureOut">
               <a:rPr lang="en-US" smtClean="0"/>
-              <a:t>1/1/15</a:t>
+              <a:t>1/5/15</a:t>
             </a:fld>
             <a:endParaRPr lang="en-US"/>
           </a:p>
@@ -12790,7 +12792,7 @@
           <a:p>
             <a:fld id="{72C66310-64BB-0647-8D90-8DA6B7A60B92}" type="datetimeFigureOut">
               <a:rPr lang="en-US" smtClean="0"/>
-              <a:t>1/1/15</a:t>
+              <a:t>1/5/15</a:t>
             </a:fld>
             <a:endParaRPr lang="en-US"/>
           </a:p>
@@ -13078,7 +13080,7 @@
           <a:p>
             <a:fld id="{72C66310-64BB-0647-8D90-8DA6B7A60B92}" type="datetimeFigureOut">
               <a:rPr lang="en-US" smtClean="0"/>
-              <a:t>1/1/15</a:t>
+              <a:t>1/5/15</a:t>
             </a:fld>
             <a:endParaRPr lang="en-US"/>
           </a:p>
@@ -13500,7 +13502,7 @@
           <a:p>
             <a:fld id="{72C66310-64BB-0647-8D90-8DA6B7A60B92}" type="datetimeFigureOut">
               <a:rPr lang="en-US" smtClean="0"/>
-              <a:t>1/1/15</a:t>
+              <a:t>1/5/15</a:t>
             </a:fld>
             <a:endParaRPr lang="en-US"/>
           </a:p>
@@ -13618,7 +13620,7 @@
           <a:p>
             <a:fld id="{72C66310-64BB-0647-8D90-8DA6B7A60B92}" type="datetimeFigureOut">
               <a:rPr lang="en-US" smtClean="0"/>
-              <a:t>1/1/15</a:t>
+              <a:t>1/5/15</a:t>
             </a:fld>
             <a:endParaRPr lang="en-US"/>
           </a:p>
@@ -13713,7 +13715,7 @@
           <a:p>
             <a:fld id="{72C66310-64BB-0647-8D90-8DA6B7A60B92}" type="datetimeFigureOut">
               <a:rPr lang="en-US" smtClean="0"/>
-              <a:t>1/1/15</a:t>
+              <a:t>1/5/15</a:t>
             </a:fld>
             <a:endParaRPr lang="en-US"/>
           </a:p>
@@ -13990,7 +13992,7 @@
           <a:p>
             <a:fld id="{72C66310-64BB-0647-8D90-8DA6B7A60B92}" type="datetimeFigureOut">
               <a:rPr lang="en-US" smtClean="0"/>
-              <a:t>1/1/15</a:t>
+              <a:t>1/5/15</a:t>
             </a:fld>
             <a:endParaRPr lang="en-US"/>
           </a:p>
@@ -14243,7 +14245,7 @@
           <a:p>
             <a:fld id="{72C66310-64BB-0647-8D90-8DA6B7A60B92}" type="datetimeFigureOut">
               <a:rPr lang="en-US" smtClean="0"/>
-              <a:t>1/1/15</a:t>
+              <a:t>1/5/15</a:t>
             </a:fld>
             <a:endParaRPr lang="en-US"/>
           </a:p>
@@ -14456,7 +14458,7 @@
           <a:p>
             <a:fld id="{72C66310-64BB-0647-8D90-8DA6B7A60B92}" type="datetimeFigureOut">
               <a:rPr lang="en-US" smtClean="0"/>
-              <a:t>1/1/15</a:t>
+              <a:t>1/5/15</a:t>
             </a:fld>
             <a:endParaRPr lang="en-US"/>
           </a:p>
@@ -16605,7 +16607,15 @@
                   <a:srgbClr val="595959"/>
                 </a:solidFill>
               </a:rPr>
-              <a:t> mongo bash</a:t>
+              <a:t> mongo </a:t>
+            </a:r>
+            <a:r>
+              <a:rPr lang="en-US" b="1" dirty="0" smtClean="0">
+                <a:solidFill>
+                  <a:srgbClr val="595959"/>
+                </a:solidFill>
+              </a:rPr>
+              <a:t>/bin/bash</a:t>
             </a:r>
             <a:endParaRPr lang="en-US" b="1" dirty="0">
               <a:solidFill>
@@ -21081,11 +21091,6 @@
               </a:rPr>
               <a:t>=172.17.0.65</a:t>
             </a:r>
-            <a:endParaRPr lang="en-US" i="1" dirty="0">
-              <a:solidFill>
-                <a:srgbClr val="7F7F7F"/>
-              </a:solidFill>
-            </a:endParaRPr>
           </a:p>
         </p:txBody>
       </p:sp>
@@ -21930,6 +21935,2017 @@
     <p:extLst>
       <p:ext uri="{BB962C8B-B14F-4D97-AF65-F5344CB8AC3E}">
         <p14:creationId xmlns:p14="http://schemas.microsoft.com/office/powerpoint/2010/main" val="3215220471"/>
+      </p:ext>
+    </p:extLst>
+  </p:cSld>
+  <p:clrMapOvr>
+    <a:masterClrMapping/>
+  </p:clrMapOvr>
+  <p:timing>
+    <p:tnLst>
+      <p:par>
+        <p:cTn xmlns:p14="http://schemas.microsoft.com/office/powerpoint/2010/main" id="1" dur="indefinite" restart="never" nodeType="tmRoot"/>
+      </p:par>
+    </p:tnLst>
+  </p:timing>
+</p:sld>
+</file>
+
+<file path=ppt/slides/slide18.xml><?xml version="1.0" encoding="utf-8"?>
+<p:sld xmlns:a="http://schemas.openxmlformats.org/drawingml/2006/main" xmlns:r="http://schemas.openxmlformats.org/officeDocument/2006/relationships" xmlns:p="http://schemas.openxmlformats.org/presentationml/2006/main">
+  <p:cSld>
+    <p:spTree>
+      <p:nvGrpSpPr>
+        <p:cNvPr id="1" name=""/>
+        <p:cNvGrpSpPr/>
+        <p:nvPr/>
+      </p:nvGrpSpPr>
+      <p:grpSpPr>
+        <a:xfrm>
+          <a:off x="0" y="0"/>
+          <a:ext cx="0" cy="0"/>
+          <a:chOff x="0" y="0"/>
+          <a:chExt cx="0" cy="0"/>
+        </a:xfrm>
+      </p:grpSpPr>
+      <p:sp>
+        <p:nvSpPr>
+          <p:cNvPr id="5" name="Rectangle 4"/>
+          <p:cNvSpPr/>
+          <p:nvPr/>
+        </p:nvSpPr>
+        <p:spPr>
+          <a:xfrm>
+            <a:off x="1851094" y="4779505"/>
+            <a:ext cx="5040000" cy="800114"/>
+          </a:xfrm>
+          <a:prstGeom prst="rect">
+            <a:avLst/>
+          </a:prstGeom>
+        </p:spPr>
+        <p:style>
+          <a:lnRef idx="1">
+            <a:schemeClr val="dk1"/>
+          </a:lnRef>
+          <a:fillRef idx="2">
+            <a:schemeClr val="dk1"/>
+          </a:fillRef>
+          <a:effectRef idx="1">
+            <a:schemeClr val="dk1"/>
+          </a:effectRef>
+          <a:fontRef idx="minor">
+            <a:schemeClr val="dk1"/>
+          </a:fontRef>
+        </p:style>
+        <p:txBody>
+          <a:bodyPr rtlCol="0" anchor="ctr"/>
+          <a:lstStyle/>
+          <a:p>
+            <a:pPr algn="ctr"/>
+            <a:r>
+              <a:rPr lang="en-US" dirty="0" smtClean="0"/>
+              <a:t>Mac OSX/Windows</a:t>
+            </a:r>
+          </a:p>
+          <a:p>
+            <a:pPr algn="ctr"/>
+            <a:r>
+              <a:rPr lang="en-US" dirty="0" smtClean="0"/>
+              <a:t>(192.168.10.4)</a:t>
+            </a:r>
+            <a:endParaRPr lang="en-US" dirty="0"/>
+          </a:p>
+        </p:txBody>
+      </p:sp>
+      <p:pic>
+        <p:nvPicPr>
+          <p:cNvPr id="4" name="Picture 3"/>
+          <p:cNvPicPr>
+            <a:picLocks noChangeAspect="1"/>
+          </p:cNvPicPr>
+          <p:nvPr/>
+        </p:nvPicPr>
+        <p:blipFill>
+          <a:blip r:embed="rId2"/>
+          <a:stretch>
+            <a:fillRect/>
+          </a:stretch>
+        </p:blipFill>
+        <p:spPr>
+          <a:xfrm>
+            <a:off x="6782843" y="4914605"/>
+            <a:ext cx="1909293" cy="1221947"/>
+          </a:xfrm>
+          <a:prstGeom prst="rect">
+            <a:avLst/>
+          </a:prstGeom>
+        </p:spPr>
+      </p:pic>
+      <p:sp>
+        <p:nvSpPr>
+          <p:cNvPr id="6" name="Rectangle 5"/>
+          <p:cNvSpPr/>
+          <p:nvPr/>
+        </p:nvSpPr>
+        <p:spPr>
+          <a:xfrm>
+            <a:off x="1851094" y="3962153"/>
+            <a:ext cx="2445606" cy="587682"/>
+          </a:xfrm>
+          <a:prstGeom prst="rect">
+            <a:avLst/>
+          </a:prstGeom>
+        </p:spPr>
+        <p:style>
+          <a:lnRef idx="2">
+            <a:schemeClr val="accent1">
+              <a:shade val="50000"/>
+            </a:schemeClr>
+          </a:lnRef>
+          <a:fillRef idx="1">
+            <a:schemeClr val="accent1"/>
+          </a:fillRef>
+          <a:effectRef idx="0">
+            <a:schemeClr val="accent1"/>
+          </a:effectRef>
+          <a:fontRef idx="minor">
+            <a:schemeClr val="lt1"/>
+          </a:fontRef>
+        </p:style>
+        <p:txBody>
+          <a:bodyPr rtlCol="0" anchor="ctr"/>
+          <a:lstStyle/>
+          <a:p>
+            <a:pPr algn="ctr"/>
+            <a:r>
+              <a:rPr lang="en-US" dirty="0" smtClean="0"/>
+              <a:t>Virtual Box</a:t>
+            </a:r>
+            <a:endParaRPr lang="en-US" dirty="0"/>
+          </a:p>
+        </p:txBody>
+      </p:sp>
+      <p:sp>
+        <p:nvSpPr>
+          <p:cNvPr id="7" name="Rectangle 6"/>
+          <p:cNvSpPr/>
+          <p:nvPr/>
+        </p:nvSpPr>
+        <p:spPr>
+          <a:xfrm>
+            <a:off x="4458841" y="3962153"/>
+            <a:ext cx="2432254" cy="587682"/>
+          </a:xfrm>
+          <a:prstGeom prst="rect">
+            <a:avLst/>
+          </a:prstGeom>
+        </p:spPr>
+        <p:style>
+          <a:lnRef idx="2">
+            <a:schemeClr val="accent3">
+              <a:shade val="50000"/>
+            </a:schemeClr>
+          </a:lnRef>
+          <a:fillRef idx="1">
+            <a:schemeClr val="accent3"/>
+          </a:fillRef>
+          <a:effectRef idx="0">
+            <a:schemeClr val="accent3"/>
+          </a:effectRef>
+          <a:fontRef idx="minor">
+            <a:schemeClr val="lt1"/>
+          </a:fontRef>
+        </p:style>
+        <p:txBody>
+          <a:bodyPr rtlCol="0" anchor="ctr"/>
+          <a:lstStyle/>
+          <a:p>
+            <a:pPr algn="ctr"/>
+            <a:r>
+              <a:rPr lang="en-US" dirty="0" smtClean="0"/>
+              <a:t>Docker Client</a:t>
+            </a:r>
+            <a:endParaRPr lang="en-US" dirty="0"/>
+          </a:p>
+        </p:txBody>
+      </p:sp>
+      <p:sp>
+        <p:nvSpPr>
+          <p:cNvPr id="8" name="Rectangle 7"/>
+          <p:cNvSpPr/>
+          <p:nvPr/>
+        </p:nvSpPr>
+        <p:spPr>
+          <a:xfrm>
+            <a:off x="1851094" y="2512855"/>
+            <a:ext cx="2445606" cy="1311232"/>
+          </a:xfrm>
+          <a:prstGeom prst="rect">
+            <a:avLst/>
+          </a:prstGeom>
+        </p:spPr>
+        <p:style>
+          <a:lnRef idx="2">
+            <a:schemeClr val="accent6">
+              <a:shade val="50000"/>
+            </a:schemeClr>
+          </a:lnRef>
+          <a:fillRef idx="1">
+            <a:schemeClr val="accent6"/>
+          </a:fillRef>
+          <a:effectRef idx="0">
+            <a:schemeClr val="accent6"/>
+          </a:effectRef>
+          <a:fontRef idx="minor">
+            <a:schemeClr val="lt1"/>
+          </a:fontRef>
+        </p:style>
+        <p:txBody>
+          <a:bodyPr rtlCol="0" anchor="ctr"/>
+          <a:lstStyle/>
+          <a:p>
+            <a:pPr algn="ctr"/>
+            <a:endParaRPr lang="en-US" dirty="0" smtClean="0">
+              <a:solidFill>
+                <a:schemeClr val="tx1"/>
+              </a:solidFill>
+            </a:endParaRPr>
+          </a:p>
+          <a:p>
+            <a:pPr algn="ctr"/>
+            <a:endParaRPr lang="en-US" dirty="0">
+              <a:solidFill>
+                <a:schemeClr val="tx1"/>
+              </a:solidFill>
+            </a:endParaRPr>
+          </a:p>
+          <a:p>
+            <a:pPr algn="ctr"/>
+            <a:endParaRPr lang="en-US" dirty="0" smtClean="0">
+              <a:solidFill>
+                <a:schemeClr val="tx1"/>
+              </a:solidFill>
+            </a:endParaRPr>
+          </a:p>
+          <a:p>
+            <a:pPr algn="ctr"/>
+            <a:r>
+              <a:rPr lang="en-US" dirty="0" smtClean="0">
+                <a:solidFill>
+                  <a:schemeClr val="tx1"/>
+                </a:solidFill>
+              </a:rPr>
+              <a:t>Boot2Docker</a:t>
+            </a:r>
+          </a:p>
+          <a:p>
+            <a:pPr algn="ctr"/>
+            <a:r>
+              <a:rPr lang="en-US" dirty="0">
+                <a:solidFill>
+                  <a:schemeClr val="tx1"/>
+                </a:solidFill>
+              </a:rPr>
+              <a:t>(172.168.10.2)</a:t>
+            </a:r>
+          </a:p>
+          <a:p>
+            <a:pPr algn="ctr"/>
+            <a:endParaRPr lang="en-US" dirty="0">
+              <a:solidFill>
+                <a:schemeClr val="tx1"/>
+              </a:solidFill>
+            </a:endParaRPr>
+          </a:p>
+        </p:txBody>
+      </p:sp>
+      <p:sp>
+        <p:nvSpPr>
+          <p:cNvPr id="9" name="Rectangle 8"/>
+          <p:cNvSpPr/>
+          <p:nvPr/>
+        </p:nvSpPr>
+        <p:spPr>
+          <a:xfrm>
+            <a:off x="1975003" y="2593915"/>
+            <a:ext cx="2211140" cy="587682"/>
+          </a:xfrm>
+          <a:prstGeom prst="rect">
+            <a:avLst/>
+          </a:prstGeom>
+          <a:solidFill>
+            <a:schemeClr val="accent3">
+              <a:lumMod val="75000"/>
+            </a:schemeClr>
+          </a:solidFill>
+        </p:spPr>
+        <p:style>
+          <a:lnRef idx="2">
+            <a:schemeClr val="accent3">
+              <a:shade val="50000"/>
+            </a:schemeClr>
+          </a:lnRef>
+          <a:fillRef idx="1">
+            <a:schemeClr val="accent3"/>
+          </a:fillRef>
+          <a:effectRef idx="0">
+            <a:schemeClr val="accent3"/>
+          </a:effectRef>
+          <a:fontRef idx="minor">
+            <a:schemeClr val="lt1"/>
+          </a:fontRef>
+        </p:style>
+        <p:txBody>
+          <a:bodyPr rtlCol="0" anchor="ctr"/>
+          <a:lstStyle/>
+          <a:p>
+            <a:pPr algn="ctr"/>
+            <a:r>
+              <a:rPr lang="en-US" dirty="0" smtClean="0"/>
+              <a:t>Docker Host</a:t>
+            </a:r>
+          </a:p>
+        </p:txBody>
+      </p:sp>
+      <p:grpSp>
+        <p:nvGrpSpPr>
+          <p:cNvPr id="13" name="Group 12"/>
+          <p:cNvGrpSpPr/>
+          <p:nvPr/>
+        </p:nvGrpSpPr>
+        <p:grpSpPr>
+          <a:xfrm>
+            <a:off x="1975003" y="1269938"/>
+            <a:ext cx="619232" cy="729538"/>
+            <a:chOff x="2607746" y="932188"/>
+            <a:chExt cx="439914" cy="378279"/>
+          </a:xfrm>
+        </p:grpSpPr>
+        <p:sp>
+          <p:nvSpPr>
+            <p:cNvPr id="10" name="Rectangle 9"/>
+            <p:cNvSpPr/>
+            <p:nvPr/>
+          </p:nvSpPr>
+          <p:spPr>
+            <a:xfrm>
+              <a:off x="2607746" y="932188"/>
+              <a:ext cx="135116" cy="378279"/>
+            </a:xfrm>
+            <a:prstGeom prst="rect">
+              <a:avLst/>
+            </a:prstGeom>
+          </p:spPr>
+          <p:style>
+            <a:lnRef idx="2">
+              <a:schemeClr val="accent5">
+                <a:shade val="50000"/>
+              </a:schemeClr>
+            </a:lnRef>
+            <a:fillRef idx="1">
+              <a:schemeClr val="accent5"/>
+            </a:fillRef>
+            <a:effectRef idx="0">
+              <a:schemeClr val="accent5"/>
+            </a:effectRef>
+            <a:fontRef idx="minor">
+              <a:schemeClr val="lt1"/>
+            </a:fontRef>
+          </p:style>
+          <p:txBody>
+            <a:bodyPr rtlCol="0" anchor="ctr"/>
+            <a:lstStyle/>
+            <a:p>
+              <a:pPr algn="ctr"/>
+              <a:endParaRPr lang="en-US"/>
+            </a:p>
+          </p:txBody>
+        </p:sp>
+        <p:sp>
+          <p:nvSpPr>
+            <p:cNvPr id="11" name="Rectangle 10"/>
+            <p:cNvSpPr/>
+            <p:nvPr/>
+          </p:nvSpPr>
+          <p:spPr>
+            <a:xfrm>
+              <a:off x="2760144" y="932188"/>
+              <a:ext cx="135116" cy="378279"/>
+            </a:xfrm>
+            <a:prstGeom prst="rect">
+              <a:avLst/>
+            </a:prstGeom>
+          </p:spPr>
+          <p:style>
+            <a:lnRef idx="2">
+              <a:schemeClr val="accent5">
+                <a:shade val="50000"/>
+              </a:schemeClr>
+            </a:lnRef>
+            <a:fillRef idx="1">
+              <a:schemeClr val="accent5"/>
+            </a:fillRef>
+            <a:effectRef idx="0">
+              <a:schemeClr val="accent5"/>
+            </a:effectRef>
+            <a:fontRef idx="minor">
+              <a:schemeClr val="lt1"/>
+            </a:fontRef>
+          </p:style>
+          <p:txBody>
+            <a:bodyPr rtlCol="0" anchor="ctr"/>
+            <a:lstStyle/>
+            <a:p>
+              <a:pPr algn="ctr"/>
+              <a:endParaRPr lang="en-US"/>
+            </a:p>
+          </p:txBody>
+        </p:sp>
+        <p:sp>
+          <p:nvSpPr>
+            <p:cNvPr id="12" name="Rectangle 11"/>
+            <p:cNvSpPr/>
+            <p:nvPr/>
+          </p:nvSpPr>
+          <p:spPr>
+            <a:xfrm>
+              <a:off x="2912544" y="932188"/>
+              <a:ext cx="135116" cy="378279"/>
+            </a:xfrm>
+            <a:prstGeom prst="rect">
+              <a:avLst/>
+            </a:prstGeom>
+          </p:spPr>
+          <p:style>
+            <a:lnRef idx="2">
+              <a:schemeClr val="accent5">
+                <a:shade val="50000"/>
+              </a:schemeClr>
+            </a:lnRef>
+            <a:fillRef idx="1">
+              <a:schemeClr val="accent5"/>
+            </a:fillRef>
+            <a:effectRef idx="0">
+              <a:schemeClr val="accent5"/>
+            </a:effectRef>
+            <a:fontRef idx="minor">
+              <a:schemeClr val="lt1"/>
+            </a:fontRef>
+          </p:style>
+          <p:txBody>
+            <a:bodyPr rtlCol="0" anchor="ctr"/>
+            <a:lstStyle/>
+            <a:p>
+              <a:pPr algn="ctr"/>
+              <a:endParaRPr lang="en-US"/>
+            </a:p>
+          </p:txBody>
+        </p:sp>
+      </p:grpSp>
+      <p:grpSp>
+        <p:nvGrpSpPr>
+          <p:cNvPr id="14" name="Group 13"/>
+          <p:cNvGrpSpPr/>
+          <p:nvPr/>
+        </p:nvGrpSpPr>
+        <p:grpSpPr>
+          <a:xfrm>
+            <a:off x="2746635" y="1269938"/>
+            <a:ext cx="619232" cy="729538"/>
+            <a:chOff x="2607746" y="932188"/>
+            <a:chExt cx="439914" cy="378279"/>
+          </a:xfrm>
+        </p:grpSpPr>
+        <p:sp>
+          <p:nvSpPr>
+            <p:cNvPr id="15" name="Rectangle 14"/>
+            <p:cNvSpPr/>
+            <p:nvPr/>
+          </p:nvSpPr>
+          <p:spPr>
+            <a:xfrm>
+              <a:off x="2607746" y="932188"/>
+              <a:ext cx="135116" cy="378279"/>
+            </a:xfrm>
+            <a:prstGeom prst="rect">
+              <a:avLst/>
+            </a:prstGeom>
+          </p:spPr>
+          <p:style>
+            <a:lnRef idx="2">
+              <a:schemeClr val="accent5">
+                <a:shade val="50000"/>
+              </a:schemeClr>
+            </a:lnRef>
+            <a:fillRef idx="1">
+              <a:schemeClr val="accent5"/>
+            </a:fillRef>
+            <a:effectRef idx="0">
+              <a:schemeClr val="accent5"/>
+            </a:effectRef>
+            <a:fontRef idx="minor">
+              <a:schemeClr val="lt1"/>
+            </a:fontRef>
+          </p:style>
+          <p:txBody>
+            <a:bodyPr rtlCol="0" anchor="ctr"/>
+            <a:lstStyle/>
+            <a:p>
+              <a:pPr algn="ctr"/>
+              <a:endParaRPr lang="en-US"/>
+            </a:p>
+          </p:txBody>
+        </p:sp>
+        <p:sp>
+          <p:nvSpPr>
+            <p:cNvPr id="16" name="Rectangle 15"/>
+            <p:cNvSpPr/>
+            <p:nvPr/>
+          </p:nvSpPr>
+          <p:spPr>
+            <a:xfrm>
+              <a:off x="2760144" y="932188"/>
+              <a:ext cx="135116" cy="378279"/>
+            </a:xfrm>
+            <a:prstGeom prst="rect">
+              <a:avLst/>
+            </a:prstGeom>
+          </p:spPr>
+          <p:style>
+            <a:lnRef idx="2">
+              <a:schemeClr val="accent5">
+                <a:shade val="50000"/>
+              </a:schemeClr>
+            </a:lnRef>
+            <a:fillRef idx="1">
+              <a:schemeClr val="accent5"/>
+            </a:fillRef>
+            <a:effectRef idx="0">
+              <a:schemeClr val="accent5"/>
+            </a:effectRef>
+            <a:fontRef idx="minor">
+              <a:schemeClr val="lt1"/>
+            </a:fontRef>
+          </p:style>
+          <p:txBody>
+            <a:bodyPr rtlCol="0" anchor="ctr"/>
+            <a:lstStyle/>
+            <a:p>
+              <a:pPr algn="ctr"/>
+              <a:endParaRPr lang="en-US"/>
+            </a:p>
+          </p:txBody>
+        </p:sp>
+        <p:sp>
+          <p:nvSpPr>
+            <p:cNvPr id="17" name="Rectangle 16"/>
+            <p:cNvSpPr/>
+            <p:nvPr/>
+          </p:nvSpPr>
+          <p:spPr>
+            <a:xfrm>
+              <a:off x="2912544" y="932188"/>
+              <a:ext cx="135116" cy="378279"/>
+            </a:xfrm>
+            <a:prstGeom prst="rect">
+              <a:avLst/>
+            </a:prstGeom>
+          </p:spPr>
+          <p:style>
+            <a:lnRef idx="2">
+              <a:schemeClr val="accent5">
+                <a:shade val="50000"/>
+              </a:schemeClr>
+            </a:lnRef>
+            <a:fillRef idx="1">
+              <a:schemeClr val="accent5"/>
+            </a:fillRef>
+            <a:effectRef idx="0">
+              <a:schemeClr val="accent5"/>
+            </a:effectRef>
+            <a:fontRef idx="minor">
+              <a:schemeClr val="lt1"/>
+            </a:fontRef>
+          </p:style>
+          <p:txBody>
+            <a:bodyPr rtlCol="0" anchor="ctr"/>
+            <a:lstStyle/>
+            <a:p>
+              <a:pPr algn="ctr"/>
+              <a:endParaRPr lang="en-US"/>
+            </a:p>
+          </p:txBody>
+        </p:sp>
+      </p:grpSp>
+      <p:grpSp>
+        <p:nvGrpSpPr>
+          <p:cNvPr id="18" name="Group 17"/>
+          <p:cNvGrpSpPr/>
+          <p:nvPr/>
+        </p:nvGrpSpPr>
+        <p:grpSpPr>
+          <a:xfrm>
+            <a:off x="3545995" y="1269938"/>
+            <a:ext cx="619232" cy="729538"/>
+            <a:chOff x="2607746" y="932188"/>
+            <a:chExt cx="439914" cy="378279"/>
+          </a:xfrm>
+        </p:grpSpPr>
+        <p:sp>
+          <p:nvSpPr>
+            <p:cNvPr id="19" name="Rectangle 18"/>
+            <p:cNvSpPr/>
+            <p:nvPr/>
+          </p:nvSpPr>
+          <p:spPr>
+            <a:xfrm>
+              <a:off x="2607746" y="932188"/>
+              <a:ext cx="135116" cy="378279"/>
+            </a:xfrm>
+            <a:prstGeom prst="rect">
+              <a:avLst/>
+            </a:prstGeom>
+          </p:spPr>
+          <p:style>
+            <a:lnRef idx="2">
+              <a:schemeClr val="accent5">
+                <a:shade val="50000"/>
+              </a:schemeClr>
+            </a:lnRef>
+            <a:fillRef idx="1">
+              <a:schemeClr val="accent5"/>
+            </a:fillRef>
+            <a:effectRef idx="0">
+              <a:schemeClr val="accent5"/>
+            </a:effectRef>
+            <a:fontRef idx="minor">
+              <a:schemeClr val="lt1"/>
+            </a:fontRef>
+          </p:style>
+          <p:txBody>
+            <a:bodyPr rtlCol="0" anchor="ctr"/>
+            <a:lstStyle/>
+            <a:p>
+              <a:pPr algn="ctr"/>
+              <a:endParaRPr lang="en-US"/>
+            </a:p>
+          </p:txBody>
+        </p:sp>
+        <p:sp>
+          <p:nvSpPr>
+            <p:cNvPr id="20" name="Rectangle 19"/>
+            <p:cNvSpPr/>
+            <p:nvPr/>
+          </p:nvSpPr>
+          <p:spPr>
+            <a:xfrm>
+              <a:off x="2760144" y="932188"/>
+              <a:ext cx="135116" cy="378279"/>
+            </a:xfrm>
+            <a:prstGeom prst="rect">
+              <a:avLst/>
+            </a:prstGeom>
+          </p:spPr>
+          <p:style>
+            <a:lnRef idx="2">
+              <a:schemeClr val="accent5">
+                <a:shade val="50000"/>
+              </a:schemeClr>
+            </a:lnRef>
+            <a:fillRef idx="1">
+              <a:schemeClr val="accent5"/>
+            </a:fillRef>
+            <a:effectRef idx="0">
+              <a:schemeClr val="accent5"/>
+            </a:effectRef>
+            <a:fontRef idx="minor">
+              <a:schemeClr val="lt1"/>
+            </a:fontRef>
+          </p:style>
+          <p:txBody>
+            <a:bodyPr rtlCol="0" anchor="ctr"/>
+            <a:lstStyle/>
+            <a:p>
+              <a:pPr algn="ctr"/>
+              <a:endParaRPr lang="en-US"/>
+            </a:p>
+          </p:txBody>
+        </p:sp>
+        <p:sp>
+          <p:nvSpPr>
+            <p:cNvPr id="21" name="Rectangle 20"/>
+            <p:cNvSpPr/>
+            <p:nvPr/>
+          </p:nvSpPr>
+          <p:spPr>
+            <a:xfrm>
+              <a:off x="2912544" y="932188"/>
+              <a:ext cx="135116" cy="378279"/>
+            </a:xfrm>
+            <a:prstGeom prst="rect">
+              <a:avLst/>
+            </a:prstGeom>
+          </p:spPr>
+          <p:style>
+            <a:lnRef idx="2">
+              <a:schemeClr val="accent5">
+                <a:shade val="50000"/>
+              </a:schemeClr>
+            </a:lnRef>
+            <a:fillRef idx="1">
+              <a:schemeClr val="accent5"/>
+            </a:fillRef>
+            <a:effectRef idx="0">
+              <a:schemeClr val="accent5"/>
+            </a:effectRef>
+            <a:fontRef idx="minor">
+              <a:schemeClr val="lt1"/>
+            </a:fontRef>
+          </p:style>
+          <p:txBody>
+            <a:bodyPr rtlCol="0" anchor="ctr"/>
+            <a:lstStyle/>
+            <a:p>
+              <a:pPr algn="ctr"/>
+              <a:endParaRPr lang="en-US"/>
+            </a:p>
+          </p:txBody>
+        </p:sp>
+      </p:grpSp>
+      <p:sp>
+        <p:nvSpPr>
+          <p:cNvPr id="22" name="Bent-Up Arrow 21"/>
+          <p:cNvSpPr/>
+          <p:nvPr/>
+        </p:nvSpPr>
+        <p:spPr>
+          <a:xfrm rot="16200000">
+            <a:off x="4370867" y="2776457"/>
+            <a:ext cx="1162174" cy="986228"/>
+          </a:xfrm>
+          <a:prstGeom prst="bentUpArrow">
+            <a:avLst>
+              <a:gd name="adj1" fmla="val 16780"/>
+              <a:gd name="adj2" fmla="val 25000"/>
+              <a:gd name="adj3" fmla="val 29110"/>
+            </a:avLst>
+          </a:prstGeom>
+        </p:spPr>
+        <p:style>
+          <a:lnRef idx="2">
+            <a:schemeClr val="accent3">
+              <a:shade val="50000"/>
+            </a:schemeClr>
+          </a:lnRef>
+          <a:fillRef idx="1">
+            <a:schemeClr val="accent3"/>
+          </a:fillRef>
+          <a:effectRef idx="0">
+            <a:schemeClr val="accent3"/>
+          </a:effectRef>
+          <a:fontRef idx="minor">
+            <a:schemeClr val="lt1"/>
+          </a:fontRef>
+        </p:style>
+        <p:txBody>
+          <a:bodyPr rtlCol="0" anchor="ctr"/>
+          <a:lstStyle/>
+          <a:p>
+            <a:pPr algn="ctr"/>
+            <a:endParaRPr lang="en-US"/>
+          </a:p>
+        </p:txBody>
+      </p:sp>
+      <p:sp>
+        <p:nvSpPr>
+          <p:cNvPr id="23" name="TextBox 22"/>
+          <p:cNvSpPr txBox="1"/>
+          <p:nvPr/>
+        </p:nvSpPr>
+        <p:spPr>
+          <a:xfrm>
+            <a:off x="1851094" y="1999476"/>
+            <a:ext cx="2445606" cy="369332"/>
+          </a:xfrm>
+          <a:prstGeom prst="rect">
+            <a:avLst/>
+          </a:prstGeom>
+          <a:noFill/>
+        </p:spPr>
+        <p:txBody>
+          <a:bodyPr wrap="square" rtlCol="0">
+            <a:spAutoFit/>
+          </a:bodyPr>
+          <a:lstStyle/>
+          <a:p>
+            <a:pPr algn="ctr"/>
+            <a:r>
+              <a:rPr lang="en-US" b="1" dirty="0" smtClean="0">
+                <a:solidFill>
+                  <a:schemeClr val="tx1">
+                    <a:lumMod val="50000"/>
+                    <a:lumOff val="50000"/>
+                  </a:schemeClr>
+                </a:solidFill>
+              </a:rPr>
+              <a:t>Docker Containers</a:t>
+            </a:r>
+            <a:endParaRPr lang="en-US" b="1" dirty="0">
+              <a:solidFill>
+                <a:schemeClr val="tx1">
+                  <a:lumMod val="50000"/>
+                  <a:lumOff val="50000"/>
+                </a:schemeClr>
+              </a:solidFill>
+            </a:endParaRPr>
+          </a:p>
+        </p:txBody>
+      </p:sp>
+      <p:sp>
+        <p:nvSpPr>
+          <p:cNvPr id="24" name="Rectangle 23"/>
+          <p:cNvSpPr/>
+          <p:nvPr/>
+        </p:nvSpPr>
+        <p:spPr>
+          <a:xfrm>
+            <a:off x="4587840" y="1269938"/>
+            <a:ext cx="2303255" cy="252430"/>
+          </a:xfrm>
+          <a:prstGeom prst="rect">
+            <a:avLst/>
+          </a:prstGeom>
+          <a:solidFill>
+            <a:schemeClr val="bg1">
+              <a:lumMod val="85000"/>
+            </a:schemeClr>
+          </a:solidFill>
+          <a:ln w="28575" cmpd="sng">
+            <a:solidFill>
+              <a:srgbClr val="7F7F7F"/>
+            </a:solidFill>
+          </a:ln>
+          <a:effectLst/>
+        </p:spPr>
+        <p:style>
+          <a:lnRef idx="1">
+            <a:schemeClr val="dk1"/>
+          </a:lnRef>
+          <a:fillRef idx="2">
+            <a:schemeClr val="dk1"/>
+          </a:fillRef>
+          <a:effectRef idx="1">
+            <a:schemeClr val="dk1"/>
+          </a:effectRef>
+          <a:fontRef idx="minor">
+            <a:schemeClr val="dk1"/>
+          </a:fontRef>
+        </p:style>
+        <p:txBody>
+          <a:bodyPr rtlCol="0" anchor="ctr"/>
+          <a:lstStyle/>
+          <a:p>
+            <a:pPr algn="ctr"/>
+            <a:r>
+              <a:rPr lang="en-US" sz="1400" b="1" dirty="0" smtClean="0">
+                <a:solidFill>
+                  <a:srgbClr val="7F7F7F"/>
+                </a:solidFill>
+              </a:rPr>
+              <a:t>http://172.168.10.2:3000</a:t>
+            </a:r>
+            <a:endParaRPr lang="en-US" sz="1400" b="1" dirty="0">
+              <a:solidFill>
+                <a:srgbClr val="7F7F7F"/>
+              </a:solidFill>
+            </a:endParaRPr>
+          </a:p>
+        </p:txBody>
+      </p:sp>
+      <p:sp>
+        <p:nvSpPr>
+          <p:cNvPr id="25" name="Rectangle 24"/>
+          <p:cNvSpPr/>
+          <p:nvPr/>
+        </p:nvSpPr>
+        <p:spPr>
+          <a:xfrm>
+            <a:off x="4587840" y="1522367"/>
+            <a:ext cx="2303255" cy="968807"/>
+          </a:xfrm>
+          <a:prstGeom prst="rect">
+            <a:avLst/>
+          </a:prstGeom>
+          <a:ln w="28575" cmpd="sng">
+            <a:solidFill>
+              <a:schemeClr val="tx1">
+                <a:lumMod val="50000"/>
+                <a:lumOff val="50000"/>
+              </a:schemeClr>
+            </a:solidFill>
+          </a:ln>
+          <a:effectLst/>
+        </p:spPr>
+        <p:style>
+          <a:lnRef idx="2">
+            <a:schemeClr val="dk1"/>
+          </a:lnRef>
+          <a:fillRef idx="1">
+            <a:schemeClr val="lt1"/>
+          </a:fillRef>
+          <a:effectRef idx="0">
+            <a:schemeClr val="dk1"/>
+          </a:effectRef>
+          <a:fontRef idx="minor">
+            <a:schemeClr val="dk1"/>
+          </a:fontRef>
+        </p:style>
+        <p:txBody>
+          <a:bodyPr rtlCol="0" anchor="ctr"/>
+          <a:lstStyle/>
+          <a:p>
+            <a:pPr algn="ctr"/>
+            <a:r>
+              <a:rPr lang="en-US" b="1" dirty="0" smtClean="0">
+                <a:solidFill>
+                  <a:schemeClr val="tx1">
+                    <a:lumMod val="50000"/>
+                    <a:lumOff val="50000"/>
+                  </a:schemeClr>
+                </a:solidFill>
+              </a:rPr>
+              <a:t>Web</a:t>
+            </a:r>
+            <a:endParaRPr lang="en-US" b="1" dirty="0">
+              <a:solidFill>
+                <a:schemeClr val="tx1">
+                  <a:lumMod val="50000"/>
+                  <a:lumOff val="50000"/>
+                </a:schemeClr>
+              </a:solidFill>
+            </a:endParaRPr>
+          </a:p>
+        </p:txBody>
+      </p:sp>
+      <p:sp>
+        <p:nvSpPr>
+          <p:cNvPr id="26" name="TextBox 25"/>
+          <p:cNvSpPr txBox="1"/>
+          <p:nvPr/>
+        </p:nvSpPr>
+        <p:spPr>
+          <a:xfrm>
+            <a:off x="1972584" y="923496"/>
+            <a:ext cx="621651" cy="338554"/>
+          </a:xfrm>
+          <a:prstGeom prst="rect">
+            <a:avLst/>
+          </a:prstGeom>
+          <a:noFill/>
+        </p:spPr>
+        <p:txBody>
+          <a:bodyPr wrap="square" rtlCol="0">
+            <a:spAutoFit/>
+          </a:bodyPr>
+          <a:lstStyle/>
+          <a:p>
+            <a:pPr algn="ctr"/>
+            <a:r>
+              <a:rPr lang="en-US" sz="1600" b="1" dirty="0" smtClean="0">
+                <a:solidFill>
+                  <a:srgbClr val="7F7F7F"/>
+                </a:solidFill>
+              </a:rPr>
+              <a:t>Web</a:t>
+            </a:r>
+            <a:endParaRPr lang="en-US" sz="1600" b="1" dirty="0">
+              <a:solidFill>
+                <a:srgbClr val="7F7F7F"/>
+              </a:solidFill>
+            </a:endParaRPr>
+          </a:p>
+        </p:txBody>
+      </p:sp>
+      <p:sp>
+        <p:nvSpPr>
+          <p:cNvPr id="27" name="TextBox 26"/>
+          <p:cNvSpPr txBox="1"/>
+          <p:nvPr/>
+        </p:nvSpPr>
+        <p:spPr>
+          <a:xfrm>
+            <a:off x="3543576" y="906619"/>
+            <a:ext cx="621651" cy="338554"/>
+          </a:xfrm>
+          <a:prstGeom prst="rect">
+            <a:avLst/>
+          </a:prstGeom>
+          <a:noFill/>
+        </p:spPr>
+        <p:txBody>
+          <a:bodyPr wrap="square" rtlCol="0">
+            <a:spAutoFit/>
+          </a:bodyPr>
+          <a:lstStyle/>
+          <a:p>
+            <a:pPr algn="ctr"/>
+            <a:r>
+              <a:rPr lang="en-US" sz="1600" b="1" dirty="0" smtClean="0">
+                <a:solidFill>
+                  <a:srgbClr val="7F7F7F"/>
+                </a:solidFill>
+              </a:rPr>
+              <a:t>DB</a:t>
+            </a:r>
+            <a:endParaRPr lang="en-US" sz="1600" b="1" dirty="0">
+              <a:solidFill>
+                <a:srgbClr val="7F7F7F"/>
+              </a:solidFill>
+            </a:endParaRPr>
+          </a:p>
+        </p:txBody>
+      </p:sp>
+      <p:sp>
+        <p:nvSpPr>
+          <p:cNvPr id="29" name="TextBox 28"/>
+          <p:cNvSpPr txBox="1"/>
+          <p:nvPr/>
+        </p:nvSpPr>
+        <p:spPr>
+          <a:xfrm>
+            <a:off x="2641563" y="906619"/>
+            <a:ext cx="810537" cy="338554"/>
+          </a:xfrm>
+          <a:prstGeom prst="rect">
+            <a:avLst/>
+          </a:prstGeom>
+          <a:noFill/>
+        </p:spPr>
+        <p:txBody>
+          <a:bodyPr wrap="square" rtlCol="0">
+            <a:spAutoFit/>
+          </a:bodyPr>
+          <a:lstStyle/>
+          <a:p>
+            <a:pPr algn="ctr"/>
+            <a:r>
+              <a:rPr lang="en-US" sz="1600" b="1" dirty="0" smtClean="0">
+                <a:solidFill>
+                  <a:srgbClr val="7F7F7F"/>
+                </a:solidFill>
+              </a:rPr>
+              <a:t>Cache</a:t>
+            </a:r>
+            <a:endParaRPr lang="en-US" sz="1600" b="1" dirty="0">
+              <a:solidFill>
+                <a:srgbClr val="7F7F7F"/>
+              </a:solidFill>
+            </a:endParaRPr>
+          </a:p>
+        </p:txBody>
+      </p:sp>
+    </p:spTree>
+    <p:extLst>
+      <p:ext uri="{BB962C8B-B14F-4D97-AF65-F5344CB8AC3E}">
+        <p14:creationId xmlns:p14="http://schemas.microsoft.com/office/powerpoint/2010/main" val="2758003368"/>
+      </p:ext>
+    </p:extLst>
+  </p:cSld>
+  <p:clrMapOvr>
+    <a:masterClrMapping/>
+  </p:clrMapOvr>
+  <p:timing>
+    <p:tnLst>
+      <p:par>
+        <p:cTn xmlns:p14="http://schemas.microsoft.com/office/powerpoint/2010/main" id="1" dur="indefinite" restart="never" nodeType="tmRoot"/>
+      </p:par>
+    </p:tnLst>
+  </p:timing>
+</p:sld>
+</file>
+
+<file path=ppt/slides/slide19.xml><?xml version="1.0" encoding="utf-8"?>
+<p:sld xmlns:a="http://schemas.openxmlformats.org/drawingml/2006/main" xmlns:r="http://schemas.openxmlformats.org/officeDocument/2006/relationships" xmlns:p="http://schemas.openxmlformats.org/presentationml/2006/main">
+  <p:cSld>
+    <p:spTree>
+      <p:nvGrpSpPr>
+        <p:cNvPr id="1" name=""/>
+        <p:cNvGrpSpPr/>
+        <p:nvPr/>
+      </p:nvGrpSpPr>
+      <p:grpSpPr>
+        <a:xfrm>
+          <a:off x="0" y="0"/>
+          <a:ext cx="0" cy="0"/>
+          <a:chOff x="0" y="0"/>
+          <a:chExt cx="0" cy="0"/>
+        </a:xfrm>
+      </p:grpSpPr>
+      <p:sp>
+        <p:nvSpPr>
+          <p:cNvPr id="5" name="Rectangle 4"/>
+          <p:cNvSpPr/>
+          <p:nvPr/>
+        </p:nvSpPr>
+        <p:spPr>
+          <a:xfrm>
+            <a:off x="1851094" y="4779505"/>
+            <a:ext cx="5040000" cy="800114"/>
+          </a:xfrm>
+          <a:prstGeom prst="rect">
+            <a:avLst/>
+          </a:prstGeom>
+        </p:spPr>
+        <p:style>
+          <a:lnRef idx="1">
+            <a:schemeClr val="dk1"/>
+          </a:lnRef>
+          <a:fillRef idx="2">
+            <a:schemeClr val="dk1"/>
+          </a:fillRef>
+          <a:effectRef idx="1">
+            <a:schemeClr val="dk1"/>
+          </a:effectRef>
+          <a:fontRef idx="minor">
+            <a:schemeClr val="dk1"/>
+          </a:fontRef>
+        </p:style>
+        <p:txBody>
+          <a:bodyPr rtlCol="0" anchor="ctr"/>
+          <a:lstStyle/>
+          <a:p>
+            <a:pPr algn="ctr"/>
+            <a:r>
+              <a:rPr lang="en-US" dirty="0" smtClean="0"/>
+              <a:t>Linux</a:t>
+            </a:r>
+          </a:p>
+          <a:p>
+            <a:pPr algn="ctr"/>
+            <a:r>
+              <a:rPr lang="en-US" dirty="0" smtClean="0"/>
+              <a:t>(192.168.10.4)</a:t>
+            </a:r>
+            <a:endParaRPr lang="en-US" dirty="0"/>
+          </a:p>
+        </p:txBody>
+      </p:sp>
+      <p:pic>
+        <p:nvPicPr>
+          <p:cNvPr id="4" name="Picture 3"/>
+          <p:cNvPicPr>
+            <a:picLocks noChangeAspect="1"/>
+          </p:cNvPicPr>
+          <p:nvPr/>
+        </p:nvPicPr>
+        <p:blipFill>
+          <a:blip r:embed="rId2"/>
+          <a:stretch>
+            <a:fillRect/>
+          </a:stretch>
+        </p:blipFill>
+        <p:spPr>
+          <a:xfrm>
+            <a:off x="6782843" y="4914605"/>
+            <a:ext cx="1909293" cy="1221947"/>
+          </a:xfrm>
+          <a:prstGeom prst="rect">
+            <a:avLst/>
+          </a:prstGeom>
+        </p:spPr>
+      </p:pic>
+      <p:sp>
+        <p:nvSpPr>
+          <p:cNvPr id="7" name="Rectangle 6"/>
+          <p:cNvSpPr/>
+          <p:nvPr/>
+        </p:nvSpPr>
+        <p:spPr>
+          <a:xfrm>
+            <a:off x="4458841" y="3962153"/>
+            <a:ext cx="2432254" cy="587682"/>
+          </a:xfrm>
+          <a:prstGeom prst="rect">
+            <a:avLst/>
+          </a:prstGeom>
+        </p:spPr>
+        <p:style>
+          <a:lnRef idx="2">
+            <a:schemeClr val="accent3">
+              <a:shade val="50000"/>
+            </a:schemeClr>
+          </a:lnRef>
+          <a:fillRef idx="1">
+            <a:schemeClr val="accent3"/>
+          </a:fillRef>
+          <a:effectRef idx="0">
+            <a:schemeClr val="accent3"/>
+          </a:effectRef>
+          <a:fontRef idx="minor">
+            <a:schemeClr val="lt1"/>
+          </a:fontRef>
+        </p:style>
+        <p:txBody>
+          <a:bodyPr rtlCol="0" anchor="ctr"/>
+          <a:lstStyle/>
+          <a:p>
+            <a:pPr algn="ctr"/>
+            <a:r>
+              <a:rPr lang="en-US" dirty="0" smtClean="0"/>
+              <a:t>Docker Client</a:t>
+            </a:r>
+            <a:endParaRPr lang="en-US" dirty="0"/>
+          </a:p>
+        </p:txBody>
+      </p:sp>
+      <p:sp>
+        <p:nvSpPr>
+          <p:cNvPr id="9" name="Rectangle 8"/>
+          <p:cNvSpPr/>
+          <p:nvPr/>
+        </p:nvSpPr>
+        <p:spPr>
+          <a:xfrm>
+            <a:off x="1851094" y="3962153"/>
+            <a:ext cx="2335049" cy="587682"/>
+          </a:xfrm>
+          <a:prstGeom prst="rect">
+            <a:avLst/>
+          </a:prstGeom>
+          <a:solidFill>
+            <a:schemeClr val="accent3">
+              <a:lumMod val="75000"/>
+            </a:schemeClr>
+          </a:solidFill>
+        </p:spPr>
+        <p:style>
+          <a:lnRef idx="2">
+            <a:schemeClr val="accent3">
+              <a:shade val="50000"/>
+            </a:schemeClr>
+          </a:lnRef>
+          <a:fillRef idx="1">
+            <a:schemeClr val="accent3"/>
+          </a:fillRef>
+          <a:effectRef idx="0">
+            <a:schemeClr val="accent3"/>
+          </a:effectRef>
+          <a:fontRef idx="minor">
+            <a:schemeClr val="lt1"/>
+          </a:fontRef>
+        </p:style>
+        <p:txBody>
+          <a:bodyPr rtlCol="0" anchor="ctr"/>
+          <a:lstStyle/>
+          <a:p>
+            <a:pPr algn="ctr"/>
+            <a:r>
+              <a:rPr lang="en-US" dirty="0" smtClean="0"/>
+              <a:t>Docker Host</a:t>
+            </a:r>
+          </a:p>
+        </p:txBody>
+      </p:sp>
+      <p:grpSp>
+        <p:nvGrpSpPr>
+          <p:cNvPr id="13" name="Group 12"/>
+          <p:cNvGrpSpPr/>
+          <p:nvPr/>
+        </p:nvGrpSpPr>
+        <p:grpSpPr>
+          <a:xfrm>
+            <a:off x="1975003" y="2809244"/>
+            <a:ext cx="619232" cy="729538"/>
+            <a:chOff x="2607746" y="932188"/>
+            <a:chExt cx="439914" cy="378279"/>
+          </a:xfrm>
+        </p:grpSpPr>
+        <p:sp>
+          <p:nvSpPr>
+            <p:cNvPr id="10" name="Rectangle 9"/>
+            <p:cNvSpPr/>
+            <p:nvPr/>
+          </p:nvSpPr>
+          <p:spPr>
+            <a:xfrm>
+              <a:off x="2607746" y="932188"/>
+              <a:ext cx="135116" cy="378279"/>
+            </a:xfrm>
+            <a:prstGeom prst="rect">
+              <a:avLst/>
+            </a:prstGeom>
+          </p:spPr>
+          <p:style>
+            <a:lnRef idx="2">
+              <a:schemeClr val="accent5">
+                <a:shade val="50000"/>
+              </a:schemeClr>
+            </a:lnRef>
+            <a:fillRef idx="1">
+              <a:schemeClr val="accent5"/>
+            </a:fillRef>
+            <a:effectRef idx="0">
+              <a:schemeClr val="accent5"/>
+            </a:effectRef>
+            <a:fontRef idx="minor">
+              <a:schemeClr val="lt1"/>
+            </a:fontRef>
+          </p:style>
+          <p:txBody>
+            <a:bodyPr rtlCol="0" anchor="ctr"/>
+            <a:lstStyle/>
+            <a:p>
+              <a:pPr algn="ctr"/>
+              <a:endParaRPr lang="en-US"/>
+            </a:p>
+          </p:txBody>
+        </p:sp>
+        <p:sp>
+          <p:nvSpPr>
+            <p:cNvPr id="11" name="Rectangle 10"/>
+            <p:cNvSpPr/>
+            <p:nvPr/>
+          </p:nvSpPr>
+          <p:spPr>
+            <a:xfrm>
+              <a:off x="2760144" y="932188"/>
+              <a:ext cx="135116" cy="378279"/>
+            </a:xfrm>
+            <a:prstGeom prst="rect">
+              <a:avLst/>
+            </a:prstGeom>
+          </p:spPr>
+          <p:style>
+            <a:lnRef idx="2">
+              <a:schemeClr val="accent5">
+                <a:shade val="50000"/>
+              </a:schemeClr>
+            </a:lnRef>
+            <a:fillRef idx="1">
+              <a:schemeClr val="accent5"/>
+            </a:fillRef>
+            <a:effectRef idx="0">
+              <a:schemeClr val="accent5"/>
+            </a:effectRef>
+            <a:fontRef idx="minor">
+              <a:schemeClr val="lt1"/>
+            </a:fontRef>
+          </p:style>
+          <p:txBody>
+            <a:bodyPr rtlCol="0" anchor="ctr"/>
+            <a:lstStyle/>
+            <a:p>
+              <a:pPr algn="ctr"/>
+              <a:endParaRPr lang="en-US"/>
+            </a:p>
+          </p:txBody>
+        </p:sp>
+        <p:sp>
+          <p:nvSpPr>
+            <p:cNvPr id="12" name="Rectangle 11"/>
+            <p:cNvSpPr/>
+            <p:nvPr/>
+          </p:nvSpPr>
+          <p:spPr>
+            <a:xfrm>
+              <a:off x="2912544" y="932188"/>
+              <a:ext cx="135116" cy="378279"/>
+            </a:xfrm>
+            <a:prstGeom prst="rect">
+              <a:avLst/>
+            </a:prstGeom>
+          </p:spPr>
+          <p:style>
+            <a:lnRef idx="2">
+              <a:schemeClr val="accent5">
+                <a:shade val="50000"/>
+              </a:schemeClr>
+            </a:lnRef>
+            <a:fillRef idx="1">
+              <a:schemeClr val="accent5"/>
+            </a:fillRef>
+            <a:effectRef idx="0">
+              <a:schemeClr val="accent5"/>
+            </a:effectRef>
+            <a:fontRef idx="minor">
+              <a:schemeClr val="lt1"/>
+            </a:fontRef>
+          </p:style>
+          <p:txBody>
+            <a:bodyPr rtlCol="0" anchor="ctr"/>
+            <a:lstStyle/>
+            <a:p>
+              <a:pPr algn="ctr"/>
+              <a:endParaRPr lang="en-US"/>
+            </a:p>
+          </p:txBody>
+        </p:sp>
+      </p:grpSp>
+      <p:grpSp>
+        <p:nvGrpSpPr>
+          <p:cNvPr id="14" name="Group 13"/>
+          <p:cNvGrpSpPr/>
+          <p:nvPr/>
+        </p:nvGrpSpPr>
+        <p:grpSpPr>
+          <a:xfrm>
+            <a:off x="2746635" y="2809244"/>
+            <a:ext cx="619232" cy="729538"/>
+            <a:chOff x="2607746" y="932188"/>
+            <a:chExt cx="439914" cy="378279"/>
+          </a:xfrm>
+        </p:grpSpPr>
+        <p:sp>
+          <p:nvSpPr>
+            <p:cNvPr id="15" name="Rectangle 14"/>
+            <p:cNvSpPr/>
+            <p:nvPr/>
+          </p:nvSpPr>
+          <p:spPr>
+            <a:xfrm>
+              <a:off x="2607746" y="932188"/>
+              <a:ext cx="135116" cy="378279"/>
+            </a:xfrm>
+            <a:prstGeom prst="rect">
+              <a:avLst/>
+            </a:prstGeom>
+          </p:spPr>
+          <p:style>
+            <a:lnRef idx="2">
+              <a:schemeClr val="accent5">
+                <a:shade val="50000"/>
+              </a:schemeClr>
+            </a:lnRef>
+            <a:fillRef idx="1">
+              <a:schemeClr val="accent5"/>
+            </a:fillRef>
+            <a:effectRef idx="0">
+              <a:schemeClr val="accent5"/>
+            </a:effectRef>
+            <a:fontRef idx="minor">
+              <a:schemeClr val="lt1"/>
+            </a:fontRef>
+          </p:style>
+          <p:txBody>
+            <a:bodyPr rtlCol="0" anchor="ctr"/>
+            <a:lstStyle/>
+            <a:p>
+              <a:pPr algn="ctr"/>
+              <a:endParaRPr lang="en-US"/>
+            </a:p>
+          </p:txBody>
+        </p:sp>
+        <p:sp>
+          <p:nvSpPr>
+            <p:cNvPr id="16" name="Rectangle 15"/>
+            <p:cNvSpPr/>
+            <p:nvPr/>
+          </p:nvSpPr>
+          <p:spPr>
+            <a:xfrm>
+              <a:off x="2760144" y="932188"/>
+              <a:ext cx="135116" cy="378279"/>
+            </a:xfrm>
+            <a:prstGeom prst="rect">
+              <a:avLst/>
+            </a:prstGeom>
+          </p:spPr>
+          <p:style>
+            <a:lnRef idx="2">
+              <a:schemeClr val="accent5">
+                <a:shade val="50000"/>
+              </a:schemeClr>
+            </a:lnRef>
+            <a:fillRef idx="1">
+              <a:schemeClr val="accent5"/>
+            </a:fillRef>
+            <a:effectRef idx="0">
+              <a:schemeClr val="accent5"/>
+            </a:effectRef>
+            <a:fontRef idx="minor">
+              <a:schemeClr val="lt1"/>
+            </a:fontRef>
+          </p:style>
+          <p:txBody>
+            <a:bodyPr rtlCol="0" anchor="ctr"/>
+            <a:lstStyle/>
+            <a:p>
+              <a:pPr algn="ctr"/>
+              <a:endParaRPr lang="en-US"/>
+            </a:p>
+          </p:txBody>
+        </p:sp>
+        <p:sp>
+          <p:nvSpPr>
+            <p:cNvPr id="17" name="Rectangle 16"/>
+            <p:cNvSpPr/>
+            <p:nvPr/>
+          </p:nvSpPr>
+          <p:spPr>
+            <a:xfrm>
+              <a:off x="2912544" y="932188"/>
+              <a:ext cx="135116" cy="378279"/>
+            </a:xfrm>
+            <a:prstGeom prst="rect">
+              <a:avLst/>
+            </a:prstGeom>
+          </p:spPr>
+          <p:style>
+            <a:lnRef idx="2">
+              <a:schemeClr val="accent5">
+                <a:shade val="50000"/>
+              </a:schemeClr>
+            </a:lnRef>
+            <a:fillRef idx="1">
+              <a:schemeClr val="accent5"/>
+            </a:fillRef>
+            <a:effectRef idx="0">
+              <a:schemeClr val="accent5"/>
+            </a:effectRef>
+            <a:fontRef idx="minor">
+              <a:schemeClr val="lt1"/>
+            </a:fontRef>
+          </p:style>
+          <p:txBody>
+            <a:bodyPr rtlCol="0" anchor="ctr"/>
+            <a:lstStyle/>
+            <a:p>
+              <a:pPr algn="ctr"/>
+              <a:endParaRPr lang="en-US"/>
+            </a:p>
+          </p:txBody>
+        </p:sp>
+      </p:grpSp>
+      <p:grpSp>
+        <p:nvGrpSpPr>
+          <p:cNvPr id="18" name="Group 17"/>
+          <p:cNvGrpSpPr/>
+          <p:nvPr/>
+        </p:nvGrpSpPr>
+        <p:grpSpPr>
+          <a:xfrm>
+            <a:off x="3545995" y="2809244"/>
+            <a:ext cx="619232" cy="729538"/>
+            <a:chOff x="2607746" y="932188"/>
+            <a:chExt cx="439914" cy="378279"/>
+          </a:xfrm>
+        </p:grpSpPr>
+        <p:sp>
+          <p:nvSpPr>
+            <p:cNvPr id="19" name="Rectangle 18"/>
+            <p:cNvSpPr/>
+            <p:nvPr/>
+          </p:nvSpPr>
+          <p:spPr>
+            <a:xfrm>
+              <a:off x="2607746" y="932188"/>
+              <a:ext cx="135116" cy="378279"/>
+            </a:xfrm>
+            <a:prstGeom prst="rect">
+              <a:avLst/>
+            </a:prstGeom>
+          </p:spPr>
+          <p:style>
+            <a:lnRef idx="2">
+              <a:schemeClr val="accent5">
+                <a:shade val="50000"/>
+              </a:schemeClr>
+            </a:lnRef>
+            <a:fillRef idx="1">
+              <a:schemeClr val="accent5"/>
+            </a:fillRef>
+            <a:effectRef idx="0">
+              <a:schemeClr val="accent5"/>
+            </a:effectRef>
+            <a:fontRef idx="minor">
+              <a:schemeClr val="lt1"/>
+            </a:fontRef>
+          </p:style>
+          <p:txBody>
+            <a:bodyPr rtlCol="0" anchor="ctr"/>
+            <a:lstStyle/>
+            <a:p>
+              <a:pPr algn="ctr"/>
+              <a:endParaRPr lang="en-US"/>
+            </a:p>
+          </p:txBody>
+        </p:sp>
+        <p:sp>
+          <p:nvSpPr>
+            <p:cNvPr id="20" name="Rectangle 19"/>
+            <p:cNvSpPr/>
+            <p:nvPr/>
+          </p:nvSpPr>
+          <p:spPr>
+            <a:xfrm>
+              <a:off x="2760144" y="932188"/>
+              <a:ext cx="135116" cy="378279"/>
+            </a:xfrm>
+            <a:prstGeom prst="rect">
+              <a:avLst/>
+            </a:prstGeom>
+          </p:spPr>
+          <p:style>
+            <a:lnRef idx="2">
+              <a:schemeClr val="accent5">
+                <a:shade val="50000"/>
+              </a:schemeClr>
+            </a:lnRef>
+            <a:fillRef idx="1">
+              <a:schemeClr val="accent5"/>
+            </a:fillRef>
+            <a:effectRef idx="0">
+              <a:schemeClr val="accent5"/>
+            </a:effectRef>
+            <a:fontRef idx="minor">
+              <a:schemeClr val="lt1"/>
+            </a:fontRef>
+          </p:style>
+          <p:txBody>
+            <a:bodyPr rtlCol="0" anchor="ctr"/>
+            <a:lstStyle/>
+            <a:p>
+              <a:pPr algn="ctr"/>
+              <a:endParaRPr lang="en-US"/>
+            </a:p>
+          </p:txBody>
+        </p:sp>
+        <p:sp>
+          <p:nvSpPr>
+            <p:cNvPr id="21" name="Rectangle 20"/>
+            <p:cNvSpPr/>
+            <p:nvPr/>
+          </p:nvSpPr>
+          <p:spPr>
+            <a:xfrm>
+              <a:off x="2912544" y="932188"/>
+              <a:ext cx="135116" cy="378279"/>
+            </a:xfrm>
+            <a:prstGeom prst="rect">
+              <a:avLst/>
+            </a:prstGeom>
+          </p:spPr>
+          <p:style>
+            <a:lnRef idx="2">
+              <a:schemeClr val="accent5">
+                <a:shade val="50000"/>
+              </a:schemeClr>
+            </a:lnRef>
+            <a:fillRef idx="1">
+              <a:schemeClr val="accent5"/>
+            </a:fillRef>
+            <a:effectRef idx="0">
+              <a:schemeClr val="accent5"/>
+            </a:effectRef>
+            <a:fontRef idx="minor">
+              <a:schemeClr val="lt1"/>
+            </a:fontRef>
+          </p:style>
+          <p:txBody>
+            <a:bodyPr rtlCol="0" anchor="ctr"/>
+            <a:lstStyle/>
+            <a:p>
+              <a:pPr algn="ctr"/>
+              <a:endParaRPr lang="en-US"/>
+            </a:p>
+          </p:txBody>
+        </p:sp>
+      </p:grpSp>
+      <p:sp>
+        <p:nvSpPr>
+          <p:cNvPr id="23" name="TextBox 22"/>
+          <p:cNvSpPr txBox="1"/>
+          <p:nvPr/>
+        </p:nvSpPr>
+        <p:spPr>
+          <a:xfrm>
+            <a:off x="1851094" y="3538782"/>
+            <a:ext cx="2445606" cy="369332"/>
+          </a:xfrm>
+          <a:prstGeom prst="rect">
+            <a:avLst/>
+          </a:prstGeom>
+          <a:noFill/>
+        </p:spPr>
+        <p:txBody>
+          <a:bodyPr wrap="square" rtlCol="0">
+            <a:spAutoFit/>
+          </a:bodyPr>
+          <a:lstStyle/>
+          <a:p>
+            <a:pPr algn="ctr"/>
+            <a:r>
+              <a:rPr lang="en-US" b="1" dirty="0" smtClean="0">
+                <a:solidFill>
+                  <a:schemeClr val="tx1">
+                    <a:lumMod val="50000"/>
+                    <a:lumOff val="50000"/>
+                  </a:schemeClr>
+                </a:solidFill>
+              </a:rPr>
+              <a:t>Docker Containers</a:t>
+            </a:r>
+            <a:endParaRPr lang="en-US" b="1" dirty="0">
+              <a:solidFill>
+                <a:schemeClr val="tx1">
+                  <a:lumMod val="50000"/>
+                  <a:lumOff val="50000"/>
+                </a:schemeClr>
+              </a:solidFill>
+            </a:endParaRPr>
+          </a:p>
+        </p:txBody>
+      </p:sp>
+      <p:sp>
+        <p:nvSpPr>
+          <p:cNvPr id="2" name="Left Arrow 1"/>
+          <p:cNvSpPr/>
+          <p:nvPr/>
+        </p:nvSpPr>
+        <p:spPr>
+          <a:xfrm>
+            <a:off x="4212271" y="4188091"/>
+            <a:ext cx="216186" cy="201819"/>
+          </a:xfrm>
+          <a:prstGeom prst="leftArrow">
+            <a:avLst>
+              <a:gd name="adj1" fmla="val 57817"/>
+              <a:gd name="adj2" fmla="val 53909"/>
+            </a:avLst>
+          </a:prstGeom>
+        </p:spPr>
+        <p:style>
+          <a:lnRef idx="2">
+            <a:schemeClr val="accent3">
+              <a:shade val="50000"/>
+            </a:schemeClr>
+          </a:lnRef>
+          <a:fillRef idx="1">
+            <a:schemeClr val="accent3"/>
+          </a:fillRef>
+          <a:effectRef idx="0">
+            <a:schemeClr val="accent3"/>
+          </a:effectRef>
+          <a:fontRef idx="minor">
+            <a:schemeClr val="lt1"/>
+          </a:fontRef>
+        </p:style>
+        <p:txBody>
+          <a:bodyPr rtlCol="0" anchor="ctr"/>
+          <a:lstStyle/>
+          <a:p>
+            <a:pPr algn="ctr"/>
+            <a:endParaRPr lang="en-US"/>
+          </a:p>
+        </p:txBody>
+      </p:sp>
+      <p:sp>
+        <p:nvSpPr>
+          <p:cNvPr id="24" name="TextBox 23"/>
+          <p:cNvSpPr txBox="1"/>
+          <p:nvPr/>
+        </p:nvSpPr>
+        <p:spPr>
+          <a:xfrm>
+            <a:off x="1972584" y="2367078"/>
+            <a:ext cx="621651" cy="338554"/>
+          </a:xfrm>
+          <a:prstGeom prst="rect">
+            <a:avLst/>
+          </a:prstGeom>
+          <a:noFill/>
+        </p:spPr>
+        <p:txBody>
+          <a:bodyPr wrap="square" rtlCol="0">
+            <a:spAutoFit/>
+          </a:bodyPr>
+          <a:lstStyle/>
+          <a:p>
+            <a:pPr algn="ctr"/>
+            <a:r>
+              <a:rPr lang="en-US" sz="1600" b="1" dirty="0" smtClean="0">
+                <a:solidFill>
+                  <a:srgbClr val="7F7F7F"/>
+                </a:solidFill>
+              </a:rPr>
+              <a:t>Web</a:t>
+            </a:r>
+            <a:endParaRPr lang="en-US" sz="1600" b="1" dirty="0">
+              <a:solidFill>
+                <a:srgbClr val="7F7F7F"/>
+              </a:solidFill>
+            </a:endParaRPr>
+          </a:p>
+        </p:txBody>
+      </p:sp>
+      <p:sp>
+        <p:nvSpPr>
+          <p:cNvPr id="25" name="TextBox 24"/>
+          <p:cNvSpPr txBox="1"/>
+          <p:nvPr/>
+        </p:nvSpPr>
+        <p:spPr>
+          <a:xfrm>
+            <a:off x="3543576" y="2350201"/>
+            <a:ext cx="621651" cy="338554"/>
+          </a:xfrm>
+          <a:prstGeom prst="rect">
+            <a:avLst/>
+          </a:prstGeom>
+          <a:noFill/>
+        </p:spPr>
+        <p:txBody>
+          <a:bodyPr wrap="square" rtlCol="0">
+            <a:spAutoFit/>
+          </a:bodyPr>
+          <a:lstStyle/>
+          <a:p>
+            <a:pPr algn="ctr"/>
+            <a:r>
+              <a:rPr lang="en-US" sz="1600" b="1" dirty="0" smtClean="0">
+                <a:solidFill>
+                  <a:srgbClr val="7F7F7F"/>
+                </a:solidFill>
+              </a:rPr>
+              <a:t>DB</a:t>
+            </a:r>
+            <a:endParaRPr lang="en-US" sz="1600" b="1" dirty="0">
+              <a:solidFill>
+                <a:srgbClr val="7F7F7F"/>
+              </a:solidFill>
+            </a:endParaRPr>
+          </a:p>
+        </p:txBody>
+      </p:sp>
+      <p:sp>
+        <p:nvSpPr>
+          <p:cNvPr id="26" name="TextBox 25"/>
+          <p:cNvSpPr txBox="1"/>
+          <p:nvPr/>
+        </p:nvSpPr>
+        <p:spPr>
+          <a:xfrm>
+            <a:off x="2699239" y="2350201"/>
+            <a:ext cx="810537" cy="338554"/>
+          </a:xfrm>
+          <a:prstGeom prst="rect">
+            <a:avLst/>
+          </a:prstGeom>
+          <a:noFill/>
+        </p:spPr>
+        <p:txBody>
+          <a:bodyPr wrap="square" rtlCol="0">
+            <a:spAutoFit/>
+          </a:bodyPr>
+          <a:lstStyle/>
+          <a:p>
+            <a:pPr algn="ctr"/>
+            <a:r>
+              <a:rPr lang="en-US" sz="1600" b="1" dirty="0" smtClean="0">
+                <a:solidFill>
+                  <a:srgbClr val="7F7F7F"/>
+                </a:solidFill>
+              </a:rPr>
+              <a:t>Cache</a:t>
+            </a:r>
+            <a:endParaRPr lang="en-US" sz="1600" b="1" dirty="0">
+              <a:solidFill>
+                <a:srgbClr val="7F7F7F"/>
+              </a:solidFill>
+            </a:endParaRPr>
+          </a:p>
+        </p:txBody>
+      </p:sp>
+      <p:sp>
+        <p:nvSpPr>
+          <p:cNvPr id="27" name="Rectangle 26"/>
+          <p:cNvSpPr/>
+          <p:nvPr/>
+        </p:nvSpPr>
+        <p:spPr>
+          <a:xfrm>
+            <a:off x="4479588" y="2498964"/>
+            <a:ext cx="2303255" cy="252430"/>
+          </a:xfrm>
+          <a:prstGeom prst="rect">
+            <a:avLst/>
+          </a:prstGeom>
+          <a:solidFill>
+            <a:schemeClr val="bg1">
+              <a:lumMod val="85000"/>
+            </a:schemeClr>
+          </a:solidFill>
+          <a:ln w="28575" cmpd="sng">
+            <a:solidFill>
+              <a:srgbClr val="7F7F7F"/>
+            </a:solidFill>
+          </a:ln>
+          <a:effectLst/>
+        </p:spPr>
+        <p:style>
+          <a:lnRef idx="1">
+            <a:schemeClr val="dk1"/>
+          </a:lnRef>
+          <a:fillRef idx="2">
+            <a:schemeClr val="dk1"/>
+          </a:fillRef>
+          <a:effectRef idx="1">
+            <a:schemeClr val="dk1"/>
+          </a:effectRef>
+          <a:fontRef idx="minor">
+            <a:schemeClr val="dk1"/>
+          </a:fontRef>
+        </p:style>
+        <p:txBody>
+          <a:bodyPr rtlCol="0" anchor="ctr"/>
+          <a:lstStyle/>
+          <a:p>
+            <a:pPr algn="ctr"/>
+            <a:r>
+              <a:rPr lang="en-US" sz="1400" b="1" dirty="0" smtClean="0">
+                <a:solidFill>
+                  <a:srgbClr val="7F7F7F"/>
+                </a:solidFill>
+              </a:rPr>
+              <a:t>http://192.168.10.4:3000</a:t>
+            </a:r>
+            <a:endParaRPr lang="en-US" sz="1400" b="1" dirty="0">
+              <a:solidFill>
+                <a:srgbClr val="7F7F7F"/>
+              </a:solidFill>
+            </a:endParaRPr>
+          </a:p>
+        </p:txBody>
+      </p:sp>
+      <p:sp>
+        <p:nvSpPr>
+          <p:cNvPr id="28" name="Rectangle 27"/>
+          <p:cNvSpPr/>
+          <p:nvPr/>
+        </p:nvSpPr>
+        <p:spPr>
+          <a:xfrm>
+            <a:off x="4479588" y="2751393"/>
+            <a:ext cx="2303255" cy="968807"/>
+          </a:xfrm>
+          <a:prstGeom prst="rect">
+            <a:avLst/>
+          </a:prstGeom>
+          <a:ln w="28575" cmpd="sng">
+            <a:solidFill>
+              <a:schemeClr val="tx1">
+                <a:lumMod val="50000"/>
+                <a:lumOff val="50000"/>
+              </a:schemeClr>
+            </a:solidFill>
+          </a:ln>
+          <a:effectLst/>
+        </p:spPr>
+        <p:style>
+          <a:lnRef idx="2">
+            <a:schemeClr val="dk1"/>
+          </a:lnRef>
+          <a:fillRef idx="1">
+            <a:schemeClr val="lt1"/>
+          </a:fillRef>
+          <a:effectRef idx="0">
+            <a:schemeClr val="dk1"/>
+          </a:effectRef>
+          <a:fontRef idx="minor">
+            <a:schemeClr val="dk1"/>
+          </a:fontRef>
+        </p:style>
+        <p:txBody>
+          <a:bodyPr rtlCol="0" anchor="ctr"/>
+          <a:lstStyle/>
+          <a:p>
+            <a:pPr algn="ctr"/>
+            <a:r>
+              <a:rPr lang="en-US" b="1" dirty="0" smtClean="0">
+                <a:solidFill>
+                  <a:schemeClr val="tx1">
+                    <a:lumMod val="50000"/>
+                    <a:lumOff val="50000"/>
+                  </a:schemeClr>
+                </a:solidFill>
+              </a:rPr>
+              <a:t>Web</a:t>
+            </a:r>
+            <a:endParaRPr lang="en-US" b="1" dirty="0">
+              <a:solidFill>
+                <a:schemeClr val="tx1">
+                  <a:lumMod val="50000"/>
+                  <a:lumOff val="50000"/>
+                </a:schemeClr>
+              </a:solidFill>
+            </a:endParaRPr>
+          </a:p>
+        </p:txBody>
+      </p:sp>
+    </p:spTree>
+    <p:extLst>
+      <p:ext uri="{BB962C8B-B14F-4D97-AF65-F5344CB8AC3E}">
+        <p14:creationId xmlns:p14="http://schemas.microsoft.com/office/powerpoint/2010/main" val="3525941321"/>
       </p:ext>
     </p:extLst>
   </p:cSld>
@@ -26475,6 +28491,36 @@
           </a:p>
         </p:txBody>
       </p:sp>
+      <p:pic>
+        <p:nvPicPr>
+          <p:cNvPr id="10" name="Picture 9" descr="docker-search.png"/>
+          <p:cNvPicPr>
+            <a:picLocks noChangeAspect="1"/>
+          </p:cNvPicPr>
+          <p:nvPr/>
+        </p:nvPicPr>
+        <p:blipFill>
+          <a:blip r:embed="rId3">
+            <a:extLst>
+              <a:ext uri="{28A0092B-C50C-407E-A947-70E740481C1C}">
+                <a14:useLocalDpi xmlns:a14="http://schemas.microsoft.com/office/drawing/2010/main" val="0"/>
+              </a:ext>
+            </a:extLst>
+          </a:blip>
+          <a:stretch>
+            <a:fillRect/>
+          </a:stretch>
+        </p:blipFill>
+        <p:spPr>
+          <a:xfrm>
+            <a:off x="1113219" y="2452751"/>
+            <a:ext cx="6846399" cy="546463"/>
+          </a:xfrm>
+          <a:prstGeom prst="rect">
+            <a:avLst/>
+          </a:prstGeom>
+        </p:spPr>
+      </p:pic>
     </p:spTree>
     <p:extLst>
       <p:ext uri="{BB962C8B-B14F-4D97-AF65-F5344CB8AC3E}">
@@ -27068,6 +29114,47 @@
               <a:t>Docker</a:t>
             </a:r>
             <a:endParaRPr lang="en-US" dirty="0"/>
+          </a:p>
+        </p:txBody>
+      </p:sp>
+      <p:sp>
+        <p:nvSpPr>
+          <p:cNvPr id="7" name="TextBox 6"/>
+          <p:cNvSpPr txBox="1"/>
+          <p:nvPr/>
+        </p:nvSpPr>
+        <p:spPr>
+          <a:xfrm>
+            <a:off x="1256582" y="749207"/>
+            <a:ext cx="4512886" cy="646331"/>
+          </a:xfrm>
+          <a:prstGeom prst="rect">
+            <a:avLst/>
+          </a:prstGeom>
+          <a:noFill/>
+        </p:spPr>
+        <p:txBody>
+          <a:bodyPr wrap="square" rtlCol="0">
+            <a:spAutoFit/>
+          </a:bodyPr>
+          <a:lstStyle/>
+          <a:p>
+            <a:r>
+              <a:rPr lang="en-US" i="1" dirty="0" smtClean="0">
+                <a:solidFill>
+                  <a:srgbClr val="7F7F7F"/>
+                </a:solidFill>
+              </a:rPr>
+              <a:t>Pull </a:t>
+            </a:r>
+            <a:r>
+              <a:rPr lang="en-US" i="1" dirty="0">
+                <a:solidFill>
+                  <a:srgbClr val="7F7F7F"/>
+                </a:solidFill>
+              </a:rPr>
+              <a:t>w/o tag always fetches the latest image. To get specific image, we need to provide tag.</a:t>
+            </a:r>
           </a:p>
         </p:txBody>
       </p:sp>

</xml_diff>